<commit_message>
Added PPT for day 6 and 8
</commit_message>
<xml_diff>
--- a/docs/Day 6 - React HTML and JSX.pptx
+++ b/docs/Day 6 - React HTML and JSX.pptx
@@ -4189,7 +4189,6 @@
             <a:rPr lang="en-US" sz="4000" dirty="0" smtClean="0"/>
             <a:t>LAB</a:t>
           </a:r>
-          <a:endParaRPr lang="en-US" sz="4000" dirty="0" smtClean="0"/>
         </a:p>
       </dgm:t>
     </dgm:pt>
@@ -4292,7 +4291,6 @@
             <a:rPr lang="en-US" sz="4000" dirty="0" smtClean="0"/>
             <a:t>JSX</a:t>
           </a:r>
-          <a:endParaRPr lang="en-US" sz="4000" dirty="0" smtClean="0"/>
         </a:p>
       </dgm:t>
     </dgm:pt>
@@ -4714,7 +4712,6 @@
             <a:rPr lang="en-US" sz="4000" kern="1200" dirty="0" smtClean="0"/>
             <a:t>LAB</a:t>
           </a:r>
-          <a:endParaRPr lang="en-US" sz="4000" kern="1200" dirty="0" smtClean="0"/>
         </a:p>
       </dsp:txBody>
       <dsp:txXfrm>
@@ -4804,7 +4801,6 @@
             <a:rPr lang="en-US" sz="4000" kern="1200" dirty="0" smtClean="0"/>
             <a:t>JSX</a:t>
           </a:r>
-          <a:endParaRPr lang="en-US" sz="4000" kern="1200" dirty="0" smtClean="0"/>
         </a:p>
       </dsp:txBody>
       <dsp:txXfrm>
@@ -11473,7 +11469,7 @@
           <a:p>
             <a:fld id="{23E88434-08F3-4832-9606-2C40898E3478}" type="datetimeFigureOut">
               <a:rPr lang="en-US" smtClean="0"/>
-              <a:t>10/6/2019</a:t>
+              <a:t>10/13/2019</a:t>
             </a:fld>
             <a:endParaRPr lang="en-US"/>
           </a:p>
@@ -11956,7 +11952,7 @@
           <a:p>
             <a:fld id="{6D690AEF-DB67-49BD-9E54-F40E8C7582BA}" type="datetime1">
               <a:rPr lang="en-US" smtClean="0"/>
-              <a:t>10/6/2019</a:t>
+              <a:t>10/13/2019</a:t>
             </a:fld>
             <a:endParaRPr lang="en-US"/>
           </a:p>
@@ -12130,7 +12126,7 @@
           <a:p>
             <a:fld id="{A78BE1D8-405D-4B84-A8C8-DBC5BE51F15B}" type="datetime1">
               <a:rPr lang="en-US" smtClean="0"/>
-              <a:t>10/6/2019</a:t>
+              <a:t>10/13/2019</a:t>
             </a:fld>
             <a:endParaRPr lang="en-US"/>
           </a:p>
@@ -12314,7 +12310,7 @@
           <a:p>
             <a:fld id="{3FE1536C-DEC2-44D0-B9D9-3AB4339E093C}" type="datetime1">
               <a:rPr lang="en-US" smtClean="0"/>
-              <a:t>10/6/2019</a:t>
+              <a:t>10/13/2019</a:t>
             </a:fld>
             <a:endParaRPr lang="en-US"/>
           </a:p>
@@ -12488,7 +12484,7 @@
           <a:p>
             <a:fld id="{D91D272B-1C4B-4FA4-AF5A-C12904DD83C9}" type="datetime1">
               <a:rPr lang="en-US" smtClean="0"/>
-              <a:t>10/6/2019</a:t>
+              <a:t>10/13/2019</a:t>
             </a:fld>
             <a:endParaRPr lang="en-US"/>
           </a:p>
@@ -12738,7 +12734,7 @@
           <a:p>
             <a:fld id="{A8008784-DE3C-42A1-BCEA-605E3D211D77}" type="datetime1">
               <a:rPr lang="en-US" smtClean="0"/>
-              <a:t>10/6/2019</a:t>
+              <a:t>10/13/2019</a:t>
             </a:fld>
             <a:endParaRPr lang="en-US"/>
           </a:p>
@@ -12974,7 +12970,7 @@
           <a:p>
             <a:fld id="{137DD620-5B3C-4E43-922F-D84B839E2CA3}" type="datetime1">
               <a:rPr lang="en-US" smtClean="0"/>
-              <a:t>10/6/2019</a:t>
+              <a:t>10/13/2019</a:t>
             </a:fld>
             <a:endParaRPr lang="en-US"/>
           </a:p>
@@ -13345,7 +13341,7 @@
           <a:p>
             <a:fld id="{53765656-739C-40EC-B65A-49E394B724D2}" type="datetime1">
               <a:rPr lang="en-US" smtClean="0"/>
-              <a:t>10/6/2019</a:t>
+              <a:t>10/13/2019</a:t>
             </a:fld>
             <a:endParaRPr lang="en-US"/>
           </a:p>
@@ -13467,7 +13463,7 @@
           <a:p>
             <a:fld id="{DBFEFA4E-AEA9-4A2F-B71D-15B6264E6A09}" type="datetime1">
               <a:rPr lang="en-US" smtClean="0"/>
-              <a:t>10/6/2019</a:t>
+              <a:t>10/13/2019</a:t>
             </a:fld>
             <a:endParaRPr lang="en-US"/>
           </a:p>
@@ -13566,7 +13562,7 @@
           <a:p>
             <a:fld id="{1A0AC173-44A8-423D-8D20-2F8F36CC1054}" type="datetime1">
               <a:rPr lang="en-US" smtClean="0"/>
-              <a:t>10/6/2019</a:t>
+              <a:t>10/13/2019</a:t>
             </a:fld>
             <a:endParaRPr lang="en-US"/>
           </a:p>
@@ -13854,7 +13850,7 @@
           <a:p>
             <a:fld id="{52F0B284-A710-4726-8BA0-160B20228744}" type="datetime1">
               <a:rPr lang="en-US" smtClean="0"/>
-              <a:t>10/6/2019</a:t>
+              <a:t>10/13/2019</a:t>
             </a:fld>
             <a:endParaRPr lang="en-US"/>
           </a:p>
@@ -14111,7 +14107,7 @@
           <a:p>
             <a:fld id="{32DEC8DF-2C3F-46B7-B1F3-83533583D3C6}" type="datetime1">
               <a:rPr lang="en-US" smtClean="0"/>
-              <a:t>10/6/2019</a:t>
+              <a:t>10/13/2019</a:t>
             </a:fld>
             <a:endParaRPr lang="en-US"/>
           </a:p>
@@ -14328,7 +14324,7 @@
           <a:p>
             <a:fld id="{B024E63D-6728-4FD5-B56A-39A568F3BFF8}" type="datetime1">
               <a:rPr lang="en-US" smtClean="0"/>
-              <a:t>10/6/2019</a:t>
+              <a:t>10/13/2019</a:t>
             </a:fld>
             <a:endParaRPr lang="en-US"/>
           </a:p>
@@ -14846,8 +14842,8 @@
         </p:nvSpPr>
         <p:spPr>
           <a:xfrm>
-            <a:off x="3631776" y="2408535"/>
-            <a:ext cx="4352730" cy="923330"/>
+            <a:off x="3362843" y="785923"/>
+            <a:ext cx="4352730" cy="1754326"/>
           </a:xfrm>
           <a:prstGeom prst="rect">
             <a:avLst/>
@@ -14886,8 +14882,38 @@
                   </a:outerShdw>
                 </a:effectLst>
               </a:rPr>
-              <a:t>Questions  ???</a:t>
-            </a:r>
+              <a:t>Questions  </a:t>
+            </a:r>
+            <a:r>
+              <a:rPr lang="en-US" sz="5400" b="1" cap="none" spc="0" dirty="0" smtClean="0">
+                <a:ln w="12700">
+                  <a:solidFill>
+                    <a:schemeClr val="accent1"/>
+                  </a:solidFill>
+                  <a:prstDash val="solid"/>
+                </a:ln>
+                <a:pattFill prst="pct50">
+                  <a:fgClr>
+                    <a:schemeClr val="accent1"/>
+                  </a:fgClr>
+                  <a:bgClr>
+                    <a:schemeClr val="accent1">
+                      <a:lumMod val="20000"/>
+                      <a:lumOff val="80000"/>
+                    </a:schemeClr>
+                  </a:bgClr>
+                </a:pattFill>
+                <a:effectLst>
+                  <a:outerShdw dist="38100" dir="2640000" algn="bl" rotWithShape="0">
+                    <a:schemeClr val="accent1"/>
+                  </a:outerShdw>
+                </a:effectLst>
+              </a:rPr>
+              <a:t>???</a:t>
+            </a:r>
+          </a:p>
+          <a:p>
+            <a:pPr algn="ctr"/>
             <a:endParaRPr lang="en-US" sz="5400" b="1" cap="none" spc="0" dirty="0">
               <a:ln w="12700">
                 <a:solidFill>
@@ -15693,16 +15719,7 @@
                 </a:solidFill>
                 <a:latin typeface="Consolas" panose="020B0609020204030204" pitchFamily="49" charset="0"/>
               </a:rPr>
-              <a:t>&lt;h1&gt;Welcome </a:t>
-            </a:r>
-            <a:r>
-              <a:rPr lang="en-HK" sz="1600" dirty="0" smtClean="0">
-                <a:solidFill>
-                  <a:srgbClr val="0000CD"/>
-                </a:solidFill>
-                <a:latin typeface="Consolas" panose="020B0609020204030204" pitchFamily="49" charset="0"/>
-              </a:rPr>
-              <a:t>to mindsmover.com&lt;/</a:t>
+              <a:t>&lt;h1&gt;Welcome to mindsmover.com&lt;/</a:t>
             </a:r>
             <a:r>
               <a:rPr lang="en-HK" sz="1600" dirty="0">
@@ -15998,7 +16015,7 @@
               <a:t>br</a:t>
             </a:r>
             <a:r>
-              <a:rPr lang="en-HK" sz="1600">
+              <a:rPr lang="en-HK" sz="1600" dirty="0">
                 <a:solidFill>
                   <a:srgbClr val="0000CD"/>
                 </a:solidFill>
@@ -16007,7 +16024,7 @@
               <a:t>/&gt; </a:t>
             </a:r>
             <a:r>
-              <a:rPr lang="en-US" sz="1600" smtClean="0">
+              <a:rPr lang="en-US" sz="1600" dirty="0" smtClean="0">
                 <a:solidFill>
                   <a:srgbClr val="0000CD"/>
                 </a:solidFill>

</xml_diff>